<commit_message>
Last corrections on notebook: sorted locations and normalized graph colors
</commit_message>
<xml_diff>
--- a/P2_01_presentation.pptx
+++ b/P2_01_presentation.pptx
@@ -14,6 +14,11 @@
     <p:sldId id="262" r:id="rId8"/>
     <p:sldId id="263" r:id="rId9"/>
     <p:sldId id="264" r:id="rId10"/>
+    <p:sldId id="265" r:id="rId11"/>
+    <p:sldId id="266" r:id="rId12"/>
+    <p:sldId id="267" r:id="rId13"/>
+    <p:sldId id="268" r:id="rId14"/>
+    <p:sldId id="269" r:id="rId15"/>
   </p:sldIdLst>
   <p:sldSz cx="12192000" cy="6858000"/>
   <p:notesSz cx="6858000" cy="9144000"/>
@@ -112,6 +117,11 @@
       </a:defRPr>
     </a:lvl9pPr>
   </p:defaultTextStyle>
+  <p:extLst>
+    <p:ext uri="{EFAFB233-063F-42B5-8137-9DF3F51BA10A}">
+      <p15:sldGuideLst xmlns:p15="http://schemas.microsoft.com/office/powerpoint/2012/main"/>
+    </p:ext>
+  </p:extLst>
 </p:presentation>
 </file>
 
@@ -450,7 +460,7 @@
           <a:p>
             <a:fld id="{49C79BCC-EE0A-4D8F-8733-F34289FA87C7}" type="datetimeFigureOut">
               <a:rPr lang="fr-FR" smtClean="0"/>
-              <a:t>25/11/2020</a:t>
+              <a:t>27/11/2020</a:t>
             </a:fld>
             <a:endParaRPr lang="fr-FR"/>
           </a:p>
@@ -1538,7 +1548,7 @@
           <a:p>
             <a:fld id="{49C79BCC-EE0A-4D8F-8733-F34289FA87C7}" type="datetimeFigureOut">
               <a:rPr lang="fr-FR" smtClean="0"/>
-              <a:t>25/11/2020</a:t>
+              <a:t>27/11/2020</a:t>
             </a:fld>
             <a:endParaRPr lang="fr-FR"/>
           </a:p>
@@ -2518,7 +2528,7 @@
           <a:p>
             <a:fld id="{49C79BCC-EE0A-4D8F-8733-F34289FA87C7}" type="datetimeFigureOut">
               <a:rPr lang="fr-FR" smtClean="0"/>
-              <a:t>25/11/2020</a:t>
+              <a:t>27/11/2020</a:t>
             </a:fld>
             <a:endParaRPr lang="fr-FR"/>
           </a:p>
@@ -3652,7 +3662,7 @@
           <a:p>
             <a:fld id="{49C79BCC-EE0A-4D8F-8733-F34289FA87C7}" type="datetimeFigureOut">
               <a:rPr lang="fr-FR" smtClean="0"/>
-              <a:t>25/11/2020</a:t>
+              <a:t>27/11/2020</a:t>
             </a:fld>
             <a:endParaRPr lang="fr-FR"/>
           </a:p>
@@ -4685,7 +4695,7 @@
           <a:p>
             <a:fld id="{49C79BCC-EE0A-4D8F-8733-F34289FA87C7}" type="datetimeFigureOut">
               <a:rPr lang="fr-FR" smtClean="0"/>
-              <a:t>25/11/2020</a:t>
+              <a:t>27/11/2020</a:t>
             </a:fld>
             <a:endParaRPr lang="fr-FR"/>
           </a:p>
@@ -5345,7 +5355,7 @@
           <a:p>
             <a:fld id="{49C79BCC-EE0A-4D8F-8733-F34289FA87C7}" type="datetimeFigureOut">
               <a:rPr lang="fr-FR" smtClean="0"/>
-              <a:t>25/11/2020</a:t>
+              <a:t>27/11/2020</a:t>
             </a:fld>
             <a:endParaRPr lang="fr-FR"/>
           </a:p>
@@ -6206,7 +6216,7 @@
           <a:p>
             <a:fld id="{49C79BCC-EE0A-4D8F-8733-F34289FA87C7}" type="datetimeFigureOut">
               <a:rPr lang="fr-FR" smtClean="0"/>
-              <a:t>25/11/2020</a:t>
+              <a:t>27/11/2020</a:t>
             </a:fld>
             <a:endParaRPr lang="fr-FR"/>
           </a:p>
@@ -6396,7 +6406,7 @@
           <a:p>
             <a:fld id="{49C79BCC-EE0A-4D8F-8733-F34289FA87C7}" type="datetimeFigureOut">
               <a:rPr lang="fr-FR" smtClean="0"/>
-              <a:t>25/11/2020</a:t>
+              <a:t>27/11/2020</a:t>
             </a:fld>
             <a:endParaRPr lang="fr-FR"/>
           </a:p>
@@ -7368,7 +7378,7 @@
           <a:p>
             <a:fld id="{49C79BCC-EE0A-4D8F-8733-F34289FA87C7}" type="datetimeFigureOut">
               <a:rPr lang="fr-FR" smtClean="0"/>
-              <a:t>25/11/2020</a:t>
+              <a:t>27/11/2020</a:t>
             </a:fld>
             <a:endParaRPr lang="fr-FR"/>
           </a:p>
@@ -7579,7 +7589,7 @@
           <a:p>
             <a:fld id="{49C79BCC-EE0A-4D8F-8733-F34289FA87C7}" type="datetimeFigureOut">
               <a:rPr lang="fr-FR" smtClean="0"/>
-              <a:t>25/11/2020</a:t>
+              <a:t>27/11/2020</a:t>
             </a:fld>
             <a:endParaRPr lang="fr-FR"/>
           </a:p>
@@ -8613,7 +8623,7 @@
           <a:p>
             <a:fld id="{49C79BCC-EE0A-4D8F-8733-F34289FA87C7}" type="datetimeFigureOut">
               <a:rPr lang="fr-FR" smtClean="0"/>
-              <a:t>25/11/2020</a:t>
+              <a:t>27/11/2020</a:t>
             </a:fld>
             <a:endParaRPr lang="fr-FR"/>
           </a:p>
@@ -8885,7 +8895,7 @@
           <a:p>
             <a:fld id="{49C79BCC-EE0A-4D8F-8733-F34289FA87C7}" type="datetimeFigureOut">
               <a:rPr lang="fr-FR" smtClean="0"/>
-              <a:t>25/11/2020</a:t>
+              <a:t>27/11/2020</a:t>
             </a:fld>
             <a:endParaRPr lang="fr-FR"/>
           </a:p>
@@ -9295,7 +9305,7 @@
           <a:p>
             <a:fld id="{49C79BCC-EE0A-4D8F-8733-F34289FA87C7}" type="datetimeFigureOut">
               <a:rPr lang="fr-FR" smtClean="0"/>
-              <a:t>25/11/2020</a:t>
+              <a:t>27/11/2020</a:t>
             </a:fld>
             <a:endParaRPr lang="fr-FR"/>
           </a:p>
@@ -9422,7 +9432,7 @@
           <a:p>
             <a:fld id="{49C79BCC-EE0A-4D8F-8733-F34289FA87C7}" type="datetimeFigureOut">
               <a:rPr lang="fr-FR" smtClean="0"/>
-              <a:t>25/11/2020</a:t>
+              <a:t>27/11/2020</a:t>
             </a:fld>
             <a:endParaRPr lang="fr-FR"/>
           </a:p>
@@ -9517,7 +9527,7 @@
           <a:p>
             <a:fld id="{49C79BCC-EE0A-4D8F-8733-F34289FA87C7}" type="datetimeFigureOut">
               <a:rPr lang="fr-FR" smtClean="0"/>
-              <a:t>25/11/2020</a:t>
+              <a:t>27/11/2020</a:t>
             </a:fld>
             <a:endParaRPr lang="fr-FR"/>
           </a:p>
@@ -10598,7 +10608,7 @@
           <a:p>
             <a:fld id="{49C79BCC-EE0A-4D8F-8733-F34289FA87C7}" type="datetimeFigureOut">
               <a:rPr lang="fr-FR" smtClean="0"/>
-              <a:t>25/11/2020</a:t>
+              <a:t>27/11/2020</a:t>
             </a:fld>
             <a:endParaRPr lang="fr-FR"/>
           </a:p>
@@ -11706,7 +11716,7 @@
           <a:p>
             <a:fld id="{49C79BCC-EE0A-4D8F-8733-F34289FA87C7}" type="datetimeFigureOut">
               <a:rPr lang="fr-FR" smtClean="0"/>
-              <a:t>25/11/2020</a:t>
+              <a:t>27/11/2020</a:t>
             </a:fld>
             <a:endParaRPr lang="fr-FR"/>
           </a:p>
@@ -12703,7 +12713,7 @@
           <a:p>
             <a:fld id="{49C79BCC-EE0A-4D8F-8733-F34289FA87C7}" type="datetimeFigureOut">
               <a:rPr lang="fr-FR" smtClean="0"/>
-              <a:t>25/11/2020</a:t>
+              <a:t>27/11/2020</a:t>
             </a:fld>
             <a:endParaRPr lang="fr-FR"/>
           </a:p>
@@ -13321,6 +13331,468 @@
   <p:clrMapOvr>
     <a:masterClrMapping/>
   </p:clrMapOvr>
+  <p:timing>
+    <p:tnLst>
+      <p:par>
+        <p:cTn id="1" dur="indefinite" restart="never" nodeType="tmRoot"/>
+      </p:par>
+    </p:tnLst>
+  </p:timing>
+</p:sld>
+</file>
+
+<file path=ppt/slides/slide10.xml><?xml version="1.0" encoding="utf-8"?>
+<p:sld xmlns:a="http://schemas.openxmlformats.org/drawingml/2006/main" xmlns:r="http://schemas.openxmlformats.org/officeDocument/2006/relationships" xmlns:p="http://schemas.openxmlformats.org/presentationml/2006/main">
+  <p:cSld>
+    <p:spTree>
+      <p:nvGrpSpPr>
+        <p:cNvPr id="1" name=""/>
+        <p:cNvGrpSpPr/>
+        <p:nvPr/>
+      </p:nvGrpSpPr>
+      <p:grpSpPr>
+        <a:xfrm>
+          <a:off x="0" y="0"/>
+          <a:ext cx="0" cy="0"/>
+          <a:chOff x="0" y="0"/>
+          <a:chExt cx="0" cy="0"/>
+        </a:xfrm>
+      </p:grpSpPr>
+      <p:sp>
+        <p:nvSpPr>
+          <p:cNvPr id="2" name="Title 1"/>
+          <p:cNvSpPr>
+            <a:spLocks noGrp="1"/>
+          </p:cNvSpPr>
+          <p:nvPr>
+            <p:ph type="title"/>
+          </p:nvPr>
+        </p:nvSpPr>
+        <p:spPr/>
+        <p:txBody>
+          <a:bodyPr/>
+          <a:lstStyle/>
+          <a:p>
+            <a:r>
+              <a:rPr lang="fr-FR" dirty="0" smtClean="0"/>
+              <a:t>1) Analyse globale</a:t>
+            </a:r>
+            <a:endParaRPr lang="fr-FR" dirty="0"/>
+          </a:p>
+        </p:txBody>
+      </p:sp>
+      <p:pic>
+        <p:nvPicPr>
+          <p:cNvPr id="4" name="Picture 3"/>
+          <p:cNvPicPr>
+            <a:picLocks noChangeAspect="1"/>
+          </p:cNvPicPr>
+          <p:nvPr/>
+        </p:nvPicPr>
+        <p:blipFill>
+          <a:blip r:embed="rId2"/>
+          <a:stretch>
+            <a:fillRect/>
+          </a:stretch>
+        </p:blipFill>
+        <p:spPr>
+          <a:xfrm>
+            <a:off x="1973364" y="2052050"/>
+            <a:ext cx="7646288" cy="4295767"/>
+          </a:xfrm>
+          <a:prstGeom prst="rect">
+            <a:avLst/>
+          </a:prstGeom>
+        </p:spPr>
+      </p:pic>
+    </p:spTree>
+    <p:extLst>
+      <p:ext uri="{BB962C8B-B14F-4D97-AF65-F5344CB8AC3E}">
+        <p14:creationId xmlns:p14="http://schemas.microsoft.com/office/powerpoint/2010/main" val="3514899696"/>
+      </p:ext>
+    </p:extLst>
+  </p:cSld>
+  <p:clrMapOvr>
+    <a:masterClrMapping/>
+  </p:clrMapOvr>
+  <p:timing>
+    <p:tnLst>
+      <p:par>
+        <p:cTn id="1" dur="indefinite" restart="never" nodeType="tmRoot"/>
+      </p:par>
+    </p:tnLst>
+  </p:timing>
+</p:sld>
+</file>
+
+<file path=ppt/slides/slide11.xml><?xml version="1.0" encoding="utf-8"?>
+<p:sld xmlns:a="http://schemas.openxmlformats.org/drawingml/2006/main" xmlns:r="http://schemas.openxmlformats.org/officeDocument/2006/relationships" xmlns:p="http://schemas.openxmlformats.org/presentationml/2006/main">
+  <p:cSld>
+    <p:spTree>
+      <p:nvGrpSpPr>
+        <p:cNvPr id="1" name=""/>
+        <p:cNvGrpSpPr/>
+        <p:nvPr/>
+      </p:nvGrpSpPr>
+      <p:grpSpPr>
+        <a:xfrm>
+          <a:off x="0" y="0"/>
+          <a:ext cx="0" cy="0"/>
+          <a:chOff x="0" y="0"/>
+          <a:chExt cx="0" cy="0"/>
+        </a:xfrm>
+      </p:grpSpPr>
+      <p:pic>
+        <p:nvPicPr>
+          <p:cNvPr id="2" name="Picture 1"/>
+          <p:cNvPicPr>
+            <a:picLocks noChangeAspect="1"/>
+          </p:cNvPicPr>
+          <p:nvPr/>
+        </p:nvPicPr>
+        <p:blipFill>
+          <a:blip r:embed="rId2"/>
+          <a:stretch>
+            <a:fillRect/>
+          </a:stretch>
+        </p:blipFill>
+        <p:spPr>
+          <a:xfrm>
+            <a:off x="1614167" y="427301"/>
+            <a:ext cx="7886572" cy="3395393"/>
+          </a:xfrm>
+          <a:prstGeom prst="rect">
+            <a:avLst/>
+          </a:prstGeom>
+        </p:spPr>
+      </p:pic>
+      <p:pic>
+        <p:nvPicPr>
+          <p:cNvPr id="3" name="Picture 2"/>
+          <p:cNvPicPr>
+            <a:picLocks noChangeAspect="1"/>
+          </p:cNvPicPr>
+          <p:nvPr/>
+        </p:nvPicPr>
+        <p:blipFill>
+          <a:blip r:embed="rId3"/>
+          <a:stretch>
+            <a:fillRect/>
+          </a:stretch>
+        </p:blipFill>
+        <p:spPr>
+          <a:xfrm>
+            <a:off x="1795142" y="3822693"/>
+            <a:ext cx="7609233" cy="2389485"/>
+          </a:xfrm>
+          <a:prstGeom prst="rect">
+            <a:avLst/>
+          </a:prstGeom>
+        </p:spPr>
+      </p:pic>
+      <p:pic>
+        <p:nvPicPr>
+          <p:cNvPr id="5" name="Picture 4"/>
+          <p:cNvPicPr>
+            <a:picLocks noChangeAspect="1"/>
+          </p:cNvPicPr>
+          <p:nvPr/>
+        </p:nvPicPr>
+        <p:blipFill>
+          <a:blip r:embed="rId4"/>
+          <a:stretch>
+            <a:fillRect/>
+          </a:stretch>
+        </p:blipFill>
+        <p:spPr>
+          <a:xfrm>
+            <a:off x="4195206" y="6237991"/>
+            <a:ext cx="3456231" cy="134453"/>
+          </a:xfrm>
+          <a:prstGeom prst="rect">
+            <a:avLst/>
+          </a:prstGeom>
+        </p:spPr>
+      </p:pic>
+    </p:spTree>
+    <p:extLst>
+      <p:ext uri="{BB962C8B-B14F-4D97-AF65-F5344CB8AC3E}">
+        <p14:creationId xmlns:p14="http://schemas.microsoft.com/office/powerpoint/2010/main" val="922876384"/>
+      </p:ext>
+    </p:extLst>
+  </p:cSld>
+  <p:clrMapOvr>
+    <a:masterClrMapping/>
+  </p:clrMapOvr>
+  <p:timing>
+    <p:tnLst>
+      <p:par>
+        <p:cTn id="1" dur="indefinite" restart="never" nodeType="tmRoot"/>
+      </p:par>
+    </p:tnLst>
+  </p:timing>
+</p:sld>
+</file>
+
+<file path=ppt/slides/slide12.xml><?xml version="1.0" encoding="utf-8"?>
+<p:sld xmlns:a="http://schemas.openxmlformats.org/drawingml/2006/main" xmlns:r="http://schemas.openxmlformats.org/officeDocument/2006/relationships" xmlns:p="http://schemas.openxmlformats.org/presentationml/2006/main">
+  <p:cSld>
+    <p:spTree>
+      <p:nvGrpSpPr>
+        <p:cNvPr id="1" name=""/>
+        <p:cNvGrpSpPr/>
+        <p:nvPr/>
+      </p:nvGrpSpPr>
+      <p:grpSpPr>
+        <a:xfrm>
+          <a:off x="0" y="0"/>
+          <a:ext cx="0" cy="0"/>
+          <a:chOff x="0" y="0"/>
+          <a:chExt cx="0" cy="0"/>
+        </a:xfrm>
+      </p:grpSpPr>
+      <p:sp>
+        <p:nvSpPr>
+          <p:cNvPr id="2" name="Title 1"/>
+          <p:cNvSpPr>
+            <a:spLocks noGrp="1"/>
+          </p:cNvSpPr>
+          <p:nvPr>
+            <p:ph type="title"/>
+          </p:nvPr>
+        </p:nvSpPr>
+        <p:spPr/>
+        <p:txBody>
+          <a:bodyPr/>
+          <a:lstStyle/>
+          <a:p>
+            <a:r>
+              <a:rPr lang="fr-FR" dirty="0" smtClean="0"/>
+              <a:t>2) </a:t>
+            </a:r>
+            <a:r>
+              <a:rPr lang="fr-FR" smtClean="0"/>
+              <a:t>Analyse </a:t>
+            </a:r>
+            <a:r>
+              <a:rPr lang="fr-FR" smtClean="0"/>
+              <a:t>par </a:t>
+            </a:r>
+            <a:r>
+              <a:rPr lang="fr-FR" dirty="0" smtClean="0"/>
+              <a:t>arrondissements</a:t>
+            </a:r>
+            <a:endParaRPr lang="fr-FR" dirty="0"/>
+          </a:p>
+        </p:txBody>
+      </p:sp>
+      <p:sp>
+        <p:nvSpPr>
+          <p:cNvPr id="5" name="TextBox 4"/>
+          <p:cNvSpPr txBox="1"/>
+          <p:nvPr/>
+        </p:nvSpPr>
+        <p:spPr>
+          <a:xfrm>
+            <a:off x="1431057" y="3202450"/>
+            <a:ext cx="3104039" cy="646331"/>
+          </a:xfrm>
+          <a:prstGeom prst="rect">
+            <a:avLst/>
+          </a:prstGeom>
+          <a:noFill/>
+        </p:spPr>
+        <p:txBody>
+          <a:bodyPr wrap="square" rtlCol="0">
+            <a:spAutoFit/>
+          </a:bodyPr>
+          <a:lstStyle/>
+          <a:p>
+            <a:r>
+              <a:rPr lang="fr-FR" dirty="0" smtClean="0"/>
+              <a:t>Le 17</a:t>
+            </a:r>
+            <a:r>
+              <a:rPr lang="fr-FR" baseline="30000" dirty="0" smtClean="0"/>
+              <a:t>e</a:t>
+            </a:r>
+            <a:r>
+              <a:rPr lang="fr-FR" dirty="0" smtClean="0"/>
+              <a:t> arrondissement, un arrondissement typique</a:t>
+            </a:r>
+            <a:endParaRPr lang="fr-FR" dirty="0"/>
+          </a:p>
+        </p:txBody>
+      </p:sp>
+    </p:spTree>
+    <p:extLst>
+      <p:ext uri="{BB962C8B-B14F-4D97-AF65-F5344CB8AC3E}">
+        <p14:creationId xmlns:p14="http://schemas.microsoft.com/office/powerpoint/2010/main" val="3664385995"/>
+      </p:ext>
+    </p:extLst>
+  </p:cSld>
+  <p:clrMapOvr>
+    <a:masterClrMapping/>
+  </p:clrMapOvr>
+  <p:timing>
+    <p:tnLst>
+      <p:par>
+        <p:cTn id="1" dur="indefinite" restart="never" nodeType="tmRoot"/>
+      </p:par>
+    </p:tnLst>
+  </p:timing>
+</p:sld>
+</file>
+
+<file path=ppt/slides/slide13.xml><?xml version="1.0" encoding="utf-8"?>
+<p:sld xmlns:a="http://schemas.openxmlformats.org/drawingml/2006/main" xmlns:r="http://schemas.openxmlformats.org/officeDocument/2006/relationships" xmlns:p="http://schemas.openxmlformats.org/presentationml/2006/main">
+  <p:cSld>
+    <p:spTree>
+      <p:nvGrpSpPr>
+        <p:cNvPr id="1" name=""/>
+        <p:cNvGrpSpPr/>
+        <p:nvPr/>
+      </p:nvGrpSpPr>
+      <p:grpSpPr>
+        <a:xfrm>
+          <a:off x="0" y="0"/>
+          <a:ext cx="0" cy="0"/>
+          <a:chOff x="0" y="0"/>
+          <a:chExt cx="0" cy="0"/>
+        </a:xfrm>
+      </p:grpSpPr>
+      <p:sp>
+        <p:nvSpPr>
+          <p:cNvPr id="2" name="Title 1"/>
+          <p:cNvSpPr>
+            <a:spLocks noGrp="1"/>
+          </p:cNvSpPr>
+          <p:nvPr>
+            <p:ph type="title"/>
+          </p:nvPr>
+        </p:nvSpPr>
+        <p:spPr/>
+        <p:txBody>
+          <a:bodyPr/>
+          <a:lstStyle/>
+          <a:p>
+            <a:r>
+              <a:rPr lang="fr-FR" dirty="0" smtClean="0"/>
+              <a:t>Départements limitrophes</a:t>
+            </a:r>
+            <a:endParaRPr lang="fr-FR" dirty="0"/>
+          </a:p>
+        </p:txBody>
+      </p:sp>
+      <p:sp>
+        <p:nvSpPr>
+          <p:cNvPr id="4" name="TextBox 3"/>
+          <p:cNvSpPr txBox="1"/>
+          <p:nvPr/>
+        </p:nvSpPr>
+        <p:spPr>
+          <a:xfrm>
+            <a:off x="1431057" y="3202450"/>
+            <a:ext cx="3104039" cy="1200329"/>
+          </a:xfrm>
+          <a:prstGeom prst="rect">
+            <a:avLst/>
+          </a:prstGeom>
+          <a:noFill/>
+        </p:spPr>
+        <p:txBody>
+          <a:bodyPr wrap="square" rtlCol="0">
+            <a:spAutoFit/>
+          </a:bodyPr>
+          <a:lstStyle/>
+          <a:p>
+            <a:r>
+              <a:rPr lang="fr-FR" dirty="0" smtClean="0"/>
+              <a:t>Les arbres référencés en Seine-Saint-Denis sont uniquement localisé dans </a:t>
+            </a:r>
+            <a:r>
+              <a:rPr lang="fr-FR" smtClean="0"/>
+              <a:t>des cimetières.</a:t>
+            </a:r>
+            <a:endParaRPr lang="fr-FR" dirty="0"/>
+          </a:p>
+        </p:txBody>
+      </p:sp>
+    </p:spTree>
+    <p:extLst>
+      <p:ext uri="{BB962C8B-B14F-4D97-AF65-F5344CB8AC3E}">
+        <p14:creationId xmlns:p14="http://schemas.microsoft.com/office/powerpoint/2010/main" val="2373912460"/>
+      </p:ext>
+    </p:extLst>
+  </p:cSld>
+  <p:clrMapOvr>
+    <a:masterClrMapping/>
+  </p:clrMapOvr>
+</p:sld>
+</file>
+
+<file path=ppt/slides/slide14.xml><?xml version="1.0" encoding="utf-8"?>
+<p:sld xmlns:a="http://schemas.openxmlformats.org/drawingml/2006/main" xmlns:r="http://schemas.openxmlformats.org/officeDocument/2006/relationships" xmlns:p="http://schemas.openxmlformats.org/presentationml/2006/main">
+  <p:cSld>
+    <p:spTree>
+      <p:nvGrpSpPr>
+        <p:cNvPr id="1" name=""/>
+        <p:cNvGrpSpPr/>
+        <p:nvPr/>
+      </p:nvGrpSpPr>
+      <p:grpSpPr>
+        <a:xfrm>
+          <a:off x="0" y="0"/>
+          <a:ext cx="0" cy="0"/>
+          <a:chOff x="0" y="0"/>
+          <a:chExt cx="0" cy="0"/>
+        </a:xfrm>
+      </p:grpSpPr>
+      <p:sp>
+        <p:nvSpPr>
+          <p:cNvPr id="2" name="Title 1"/>
+          <p:cNvSpPr>
+            <a:spLocks noGrp="1"/>
+          </p:cNvSpPr>
+          <p:nvPr>
+            <p:ph type="title"/>
+          </p:nvPr>
+        </p:nvSpPr>
+        <p:spPr/>
+        <p:txBody>
+          <a:bodyPr/>
+          <a:lstStyle/>
+          <a:p>
+            <a:r>
+              <a:rPr lang="fr-FR" dirty="0" smtClean="0"/>
+              <a:t>3) </a:t>
+            </a:r>
+            <a:r>
+              <a:rPr lang="fr-FR" dirty="0" smtClean="0"/>
+              <a:t>Bilan des </a:t>
+            </a:r>
+            <a:r>
+              <a:rPr lang="fr-FR" dirty="0" err="1" smtClean="0"/>
+              <a:t>recomandations</a:t>
+            </a:r>
+            <a:r>
+              <a:rPr lang="fr-FR" dirty="0" smtClean="0"/>
+              <a:t> </a:t>
+            </a:r>
+            <a:endParaRPr lang="fr-FR" dirty="0"/>
+          </a:p>
+        </p:txBody>
+      </p:sp>
+    </p:spTree>
+    <p:extLst>
+      <p:ext uri="{BB962C8B-B14F-4D97-AF65-F5344CB8AC3E}">
+        <p14:creationId xmlns:p14="http://schemas.microsoft.com/office/powerpoint/2010/main" val="51399808"/>
+      </p:ext>
+    </p:extLst>
+  </p:cSld>
+  <p:clrMapOvr>
+    <a:masterClrMapping/>
+  </p:clrMapOvr>
 </p:sld>
 </file>
 
@@ -13438,6 +13910,13 @@
   <p:clrMapOvr>
     <a:masterClrMapping/>
   </p:clrMapOvr>
+  <p:timing>
+    <p:tnLst>
+      <p:par>
+        <p:cTn id="1" dur="indefinite" restart="never" nodeType="tmRoot"/>
+      </p:par>
+    </p:tnLst>
+  </p:timing>
 </p:sld>
 </file>
 
@@ -13563,6 +14042,13 @@
   <p:clrMapOvr>
     <a:masterClrMapping/>
   </p:clrMapOvr>
+  <p:timing>
+    <p:tnLst>
+      <p:par>
+        <p:cTn id="1" dur="indefinite" restart="never" nodeType="tmRoot"/>
+      </p:par>
+    </p:tnLst>
+  </p:timing>
 </p:sld>
 </file>
 
@@ -13621,6 +14107,13 @@
   <p:clrMapOvr>
     <a:masterClrMapping/>
   </p:clrMapOvr>
+  <p:timing>
+    <p:tnLst>
+      <p:par>
+        <p:cTn id="1" dur="indefinite" restart="never" nodeType="tmRoot"/>
+      </p:par>
+    </p:tnLst>
+  </p:timing>
 </p:sld>
 </file>
 
@@ -13712,7 +14205,6 @@
               <a:rPr lang="fr-FR" dirty="0"/>
               <a:t>des stades de développement manquants. Pour l'attribuer à un arbre, on calcule la moyenne des hauteurs des arbres de la même espèce, dans le même arrondissement, pour chaque stade de développement. Enfin, on assigne le stade dont la moyenne associée est la plus proche de la hauteur de l'arbre.</a:t>
             </a:r>
-            <a:endParaRPr lang="fr-FR" dirty="0"/>
           </a:p>
         </p:txBody>
       </p:sp>
@@ -13726,6 +14218,13 @@
   <p:clrMapOvr>
     <a:masterClrMapping/>
   </p:clrMapOvr>
+  <p:timing>
+    <p:tnLst>
+      <p:par>
+        <p:cTn id="1" dur="indefinite" restart="never" nodeType="tmRoot"/>
+      </p:par>
+    </p:tnLst>
+  </p:timing>
 </p:sld>
 </file>
 
@@ -13891,6 +14390,13 @@
   <p:clrMapOvr>
     <a:masterClrMapping/>
   </p:clrMapOvr>
+  <p:timing>
+    <p:tnLst>
+      <p:par>
+        <p:cTn id="1" dur="indefinite" restart="never" nodeType="tmRoot"/>
+      </p:par>
+    </p:tnLst>
+  </p:timing>
 </p:sld>
 </file>
 
@@ -14016,6 +14522,13 @@
   <p:clrMapOvr>
     <a:masterClrMapping/>
   </p:clrMapOvr>
+  <p:timing>
+    <p:tnLst>
+      <p:par>
+        <p:cTn id="1" dur="indefinite" restart="never" nodeType="tmRoot"/>
+      </p:par>
+    </p:tnLst>
+  </p:timing>
 </p:sld>
 </file>
 
@@ -14120,6 +14633,13 @@
   <p:clrMapOvr>
     <a:masterClrMapping/>
   </p:clrMapOvr>
+  <p:timing>
+    <p:tnLst>
+      <p:par>
+        <p:cTn id="1" dur="indefinite" restart="never" nodeType="tmRoot"/>
+      </p:par>
+    </p:tnLst>
+  </p:timing>
 </p:sld>
 </file>
 
@@ -14186,6 +14706,13 @@
   <p:clrMapOvr>
     <a:masterClrMapping/>
   </p:clrMapOvr>
+  <p:timing>
+    <p:tnLst>
+      <p:par>
+        <p:cTn id="1" dur="indefinite" restart="never" nodeType="tmRoot"/>
+      </p:par>
+    </p:tnLst>
+  </p:timing>
 </p:sld>
 </file>
 

</xml_diff>

<commit_message>
small corrections on notebook, updated project files
</commit_message>
<xml_diff>
--- a/P2_01_presentation.pptx
+++ b/P2_01_presentation.pptx
@@ -17,8 +17,12 @@
     <p:sldId id="265" r:id="rId11"/>
     <p:sldId id="266" r:id="rId12"/>
     <p:sldId id="267" r:id="rId13"/>
-    <p:sldId id="268" r:id="rId14"/>
-    <p:sldId id="269" r:id="rId15"/>
+    <p:sldId id="270" r:id="rId14"/>
+    <p:sldId id="271" r:id="rId15"/>
+    <p:sldId id="272" r:id="rId16"/>
+    <p:sldId id="273" r:id="rId17"/>
+    <p:sldId id="268" r:id="rId18"/>
+    <p:sldId id="269" r:id="rId19"/>
   </p:sldIdLst>
   <p:sldSz cx="12192000" cy="6858000"/>
   <p:notesSz cx="6858000" cy="9144000"/>
@@ -13571,16 +13575,8 @@
               <a:t>2) </a:t>
             </a:r>
             <a:r>
-              <a:rPr lang="fr-FR" smtClean="0"/>
-              <a:t>Analyse </a:t>
-            </a:r>
-            <a:r>
-              <a:rPr lang="fr-FR" smtClean="0"/>
-              <a:t>par </a:t>
-            </a:r>
-            <a:r>
               <a:rPr lang="fr-FR" dirty="0" smtClean="0"/>
-              <a:t>arrondissements</a:t>
+              <a:t>Arrondissements non périphériques </a:t>
             </a:r>
             <a:endParaRPr lang="fr-FR" dirty="0"/>
           </a:p>
@@ -13594,8 +13590,8 @@
         </p:nvSpPr>
         <p:spPr>
           <a:xfrm>
-            <a:off x="1431057" y="3202450"/>
-            <a:ext cx="3104039" cy="646331"/>
+            <a:off x="1008712" y="2222443"/>
+            <a:ext cx="3848205" cy="369332"/>
           </a:xfrm>
           <a:prstGeom prst="rect">
             <a:avLst/>
@@ -13610,7 +13606,11 @@
           <a:p>
             <a:r>
               <a:rPr lang="fr-FR" dirty="0" smtClean="0"/>
-              <a:t>Le 17</a:t>
+              <a:t>Le </a:t>
+            </a:r>
+            <a:r>
+              <a:rPr lang="fr-FR" dirty="0" smtClean="0"/>
+              <a:t>4</a:t>
             </a:r>
             <a:r>
               <a:rPr lang="fr-FR" baseline="30000" dirty="0" smtClean="0"/>
@@ -13618,12 +13618,64 @@
             </a:r>
             <a:r>
               <a:rPr lang="fr-FR" dirty="0" smtClean="0"/>
-              <a:t> arrondissement, un arrondissement typique</a:t>
+              <a:t>, </a:t>
+            </a:r>
+            <a:r>
+              <a:rPr lang="fr-FR" dirty="0" smtClean="0"/>
+              <a:t>un arrondissement typique</a:t>
             </a:r>
             <a:endParaRPr lang="fr-FR" dirty="0"/>
           </a:p>
         </p:txBody>
       </p:sp>
+      <p:pic>
+        <p:nvPicPr>
+          <p:cNvPr id="3" name="Picture 2"/>
+          <p:cNvPicPr>
+            <a:picLocks noChangeAspect="1"/>
+          </p:cNvPicPr>
+          <p:nvPr/>
+        </p:nvPicPr>
+        <p:blipFill>
+          <a:blip r:embed="rId2"/>
+          <a:stretch>
+            <a:fillRect/>
+          </a:stretch>
+        </p:blipFill>
+        <p:spPr>
+          <a:xfrm>
+            <a:off x="5279262" y="1763192"/>
+            <a:ext cx="5724427" cy="4859032"/>
+          </a:xfrm>
+          <a:prstGeom prst="rect">
+            <a:avLst/>
+          </a:prstGeom>
+        </p:spPr>
+      </p:pic>
+      <p:pic>
+        <p:nvPicPr>
+          <p:cNvPr id="8" name="Picture 7"/>
+          <p:cNvPicPr>
+            <a:picLocks noChangeAspect="1"/>
+          </p:cNvPicPr>
+          <p:nvPr/>
+        </p:nvPicPr>
+        <p:blipFill>
+          <a:blip r:embed="rId3"/>
+          <a:stretch>
+            <a:fillRect/>
+          </a:stretch>
+        </p:blipFill>
+        <p:spPr>
+          <a:xfrm>
+            <a:off x="1346901" y="3244309"/>
+            <a:ext cx="3171825" cy="2362200"/>
+          </a:xfrm>
+          <a:prstGeom prst="rect">
+            <a:avLst/>
+          </a:prstGeom>
+        </p:spPr>
+      </p:pic>
     </p:spTree>
     <p:extLst>
       <p:ext uri="{BB962C8B-B14F-4D97-AF65-F5344CB8AC3E}">
@@ -13661,39 +13713,40 @@
           <a:chExt cx="0" cy="0"/>
         </a:xfrm>
       </p:grpSpPr>
+      <p:pic>
+        <p:nvPicPr>
+          <p:cNvPr id="2" name="Picture 1"/>
+          <p:cNvPicPr>
+            <a:picLocks noChangeAspect="1"/>
+          </p:cNvPicPr>
+          <p:nvPr/>
+        </p:nvPicPr>
+        <p:blipFill>
+          <a:blip r:embed="rId2"/>
+          <a:stretch>
+            <a:fillRect/>
+          </a:stretch>
+        </p:blipFill>
+        <p:spPr>
+          <a:xfrm>
+            <a:off x="4924874" y="567472"/>
+            <a:ext cx="6663802" cy="5797932"/>
+          </a:xfrm>
+          <a:prstGeom prst="rect">
+            <a:avLst/>
+          </a:prstGeom>
+        </p:spPr>
+      </p:pic>
       <p:sp>
         <p:nvSpPr>
-          <p:cNvPr id="2" name="Title 1"/>
-          <p:cNvSpPr>
-            <a:spLocks noGrp="1"/>
-          </p:cNvSpPr>
-          <p:nvPr>
-            <p:ph type="title"/>
-          </p:nvPr>
-        </p:nvSpPr>
-        <p:spPr/>
-        <p:txBody>
-          <a:bodyPr/>
-          <a:lstStyle/>
-          <a:p>
-            <a:r>
-              <a:rPr lang="fr-FR" dirty="0" smtClean="0"/>
-              <a:t>Départements limitrophes</a:t>
-            </a:r>
-            <a:endParaRPr lang="fr-FR" dirty="0"/>
-          </a:p>
-        </p:txBody>
-      </p:sp>
-      <p:sp>
-        <p:nvSpPr>
-          <p:cNvPr id="4" name="TextBox 3"/>
+          <p:cNvPr id="3" name="TextBox 2"/>
           <p:cNvSpPr txBox="1"/>
           <p:nvPr/>
         </p:nvSpPr>
         <p:spPr>
           <a:xfrm>
-            <a:off x="1431057" y="3202450"/>
-            <a:ext cx="3104039" cy="1200329"/>
+            <a:off x="617977" y="1377116"/>
+            <a:ext cx="4186557" cy="369332"/>
           </a:xfrm>
           <a:prstGeom prst="rect">
             <a:avLst/>
@@ -13708,20 +13761,52 @@
           <a:p>
             <a:r>
               <a:rPr lang="fr-FR" dirty="0" smtClean="0"/>
-              <a:t>Les arbres référencés en Seine-Saint-Denis sont uniquement localisé dans </a:t>
+              <a:t>Le </a:t>
             </a:r>
             <a:r>
-              <a:rPr lang="fr-FR" smtClean="0"/>
-              <a:t>des cimetières.</a:t>
+              <a:rPr lang="fr-FR" dirty="0" smtClean="0"/>
+              <a:t>2</a:t>
+            </a:r>
+            <a:r>
+              <a:rPr lang="fr-FR" baseline="30000" dirty="0" smtClean="0"/>
+              <a:t>e</a:t>
+            </a:r>
+            <a:r>
+              <a:rPr lang="fr-FR" dirty="0" smtClean="0"/>
+              <a:t>: arrondissement peu exigeant</a:t>
             </a:r>
             <a:endParaRPr lang="fr-FR" dirty="0"/>
           </a:p>
         </p:txBody>
       </p:sp>
+      <p:pic>
+        <p:nvPicPr>
+          <p:cNvPr id="5" name="Picture 4"/>
+          <p:cNvPicPr>
+            <a:picLocks noChangeAspect="1"/>
+          </p:cNvPicPr>
+          <p:nvPr/>
+        </p:nvPicPr>
+        <p:blipFill>
+          <a:blip r:embed="rId3"/>
+          <a:stretch>
+            <a:fillRect/>
+          </a:stretch>
+        </p:blipFill>
+        <p:spPr>
+          <a:xfrm>
+            <a:off x="936409" y="2258408"/>
+            <a:ext cx="3467100" cy="2647950"/>
+          </a:xfrm>
+          <a:prstGeom prst="rect">
+            <a:avLst/>
+          </a:prstGeom>
+        </p:spPr>
+      </p:pic>
     </p:spTree>
     <p:extLst>
       <p:ext uri="{BB962C8B-B14F-4D97-AF65-F5344CB8AC3E}">
-        <p14:creationId xmlns:p14="http://schemas.microsoft.com/office/powerpoint/2010/main" val="2373912460"/>
+        <p14:creationId xmlns:p14="http://schemas.microsoft.com/office/powerpoint/2010/main" val="2987112370"/>
       </p:ext>
     </p:extLst>
   </p:cSld>
@@ -13732,6 +13817,123 @@
 </file>
 
 <file path=ppt/slides/slide14.xml><?xml version="1.0" encoding="utf-8"?>
+<p:sld xmlns:a="http://schemas.openxmlformats.org/drawingml/2006/main" xmlns:r="http://schemas.openxmlformats.org/officeDocument/2006/relationships" xmlns:p="http://schemas.openxmlformats.org/presentationml/2006/main">
+  <p:cSld>
+    <p:spTree>
+      <p:nvGrpSpPr>
+        <p:cNvPr id="1" name=""/>
+        <p:cNvGrpSpPr/>
+        <p:nvPr/>
+      </p:nvGrpSpPr>
+      <p:grpSpPr>
+        <a:xfrm>
+          <a:off x="0" y="0"/>
+          <a:ext cx="0" cy="0"/>
+          <a:chOff x="0" y="0"/>
+          <a:chExt cx="0" cy="0"/>
+        </a:xfrm>
+      </p:grpSpPr>
+      <p:sp>
+        <p:nvSpPr>
+          <p:cNvPr id="2" name="TextBox 1"/>
+          <p:cNvSpPr txBox="1"/>
+          <p:nvPr/>
+        </p:nvSpPr>
+        <p:spPr>
+          <a:xfrm>
+            <a:off x="124838" y="1182438"/>
+            <a:ext cx="4186557" cy="646331"/>
+          </a:xfrm>
+          <a:prstGeom prst="rect">
+            <a:avLst/>
+          </a:prstGeom>
+          <a:noFill/>
+        </p:spPr>
+        <p:txBody>
+          <a:bodyPr wrap="square" rtlCol="0">
+            <a:spAutoFit/>
+          </a:bodyPr>
+          <a:lstStyle/>
+          <a:p>
+            <a:pPr algn="ctr"/>
+            <a:r>
+              <a:rPr lang="fr-FR" dirty="0" smtClean="0"/>
+              <a:t>7</a:t>
+            </a:r>
+            <a:r>
+              <a:rPr lang="fr-FR" baseline="30000" dirty="0" smtClean="0"/>
+              <a:t>e</a:t>
+            </a:r>
+            <a:r>
+              <a:rPr lang="fr-FR" dirty="0" smtClean="0"/>
+              <a:t> arrondissement: le cas du Champs de Mars</a:t>
+            </a:r>
+            <a:endParaRPr lang="fr-FR" dirty="0"/>
+          </a:p>
+        </p:txBody>
+      </p:sp>
+      <p:pic>
+        <p:nvPicPr>
+          <p:cNvPr id="3" name="Picture 2"/>
+          <p:cNvPicPr>
+            <a:picLocks noChangeAspect="1"/>
+          </p:cNvPicPr>
+          <p:nvPr/>
+        </p:nvPicPr>
+        <p:blipFill>
+          <a:blip r:embed="rId2"/>
+          <a:stretch>
+            <a:fillRect/>
+          </a:stretch>
+        </p:blipFill>
+        <p:spPr>
+          <a:xfrm>
+            <a:off x="863345" y="2346898"/>
+            <a:ext cx="3448050" cy="2647950"/>
+          </a:xfrm>
+          <a:prstGeom prst="rect">
+            <a:avLst/>
+          </a:prstGeom>
+        </p:spPr>
+      </p:pic>
+      <p:pic>
+        <p:nvPicPr>
+          <p:cNvPr id="4" name="Picture 3"/>
+          <p:cNvPicPr>
+            <a:picLocks noChangeAspect="1"/>
+          </p:cNvPicPr>
+          <p:nvPr/>
+        </p:nvPicPr>
+        <p:blipFill>
+          <a:blip r:embed="rId3"/>
+          <a:stretch>
+            <a:fillRect/>
+          </a:stretch>
+        </p:blipFill>
+        <p:spPr>
+          <a:xfrm>
+            <a:off x="4390903" y="475911"/>
+            <a:ext cx="6829670" cy="5923693"/>
+          </a:xfrm>
+          <a:prstGeom prst="rect">
+            <a:avLst/>
+          </a:prstGeom>
+        </p:spPr>
+      </p:pic>
+    </p:spTree>
+    <p:extLst>
+      <p:ext uri="{BB962C8B-B14F-4D97-AF65-F5344CB8AC3E}">
+        <p14:creationId xmlns:p14="http://schemas.microsoft.com/office/powerpoint/2010/main" val="3156471763"/>
+      </p:ext>
+    </p:extLst>
+  </p:cSld>
+  <p:clrMapOvr>
+    <a:masterClrMapping/>
+  </p:clrMapOvr>
+</p:sld>
+</file>
+
+<file path=ppt/slides/slide15.xml><?xml version="1.0" encoding="utf-8"?>
 <p:sld xmlns:a="http://schemas.openxmlformats.org/drawingml/2006/main" xmlns:r="http://schemas.openxmlformats.org/officeDocument/2006/relationships" xmlns:p="http://schemas.openxmlformats.org/presentationml/2006/main">
   <p:cSld>
     <p:spTree>
@@ -13765,19 +13967,430 @@
           <a:p>
             <a:r>
               <a:rPr lang="fr-FR" dirty="0" smtClean="0"/>
-              <a:t>3) </a:t>
+              <a:t>3) Arrondissements périphériques</a:t>
+            </a:r>
+            <a:endParaRPr lang="fr-FR" dirty="0"/>
+          </a:p>
+        </p:txBody>
+      </p:sp>
+      <p:sp>
+        <p:nvSpPr>
+          <p:cNvPr id="3" name="TextBox 2"/>
+          <p:cNvSpPr txBox="1"/>
+          <p:nvPr/>
+        </p:nvSpPr>
+        <p:spPr>
+          <a:xfrm>
+            <a:off x="784537" y="2358128"/>
+            <a:ext cx="4194519" cy="369332"/>
+          </a:xfrm>
+          <a:prstGeom prst="rect">
+            <a:avLst/>
+          </a:prstGeom>
+          <a:noFill/>
+        </p:spPr>
+        <p:txBody>
+          <a:bodyPr wrap="square" rtlCol="0">
+            <a:spAutoFit/>
+          </a:bodyPr>
+          <a:lstStyle/>
+          <a:p>
+            <a:r>
+              <a:rPr lang="fr-FR" dirty="0" smtClean="0"/>
+              <a:t>Le </a:t>
             </a:r>
             <a:r>
               <a:rPr lang="fr-FR" dirty="0" smtClean="0"/>
-              <a:t>Bilan des </a:t>
+              <a:t>15</a:t>
             </a:r>
             <a:r>
-              <a:rPr lang="fr-FR" dirty="0" err="1" smtClean="0"/>
-              <a:t>recomandations</a:t>
+              <a:rPr lang="fr-FR" baseline="30000" dirty="0" smtClean="0"/>
+              <a:t>e</a:t>
             </a:r>
             <a:r>
               <a:rPr lang="fr-FR" dirty="0" smtClean="0"/>
-              <a:t> </a:t>
+              <a:t>, </a:t>
+            </a:r>
+            <a:r>
+              <a:rPr lang="fr-FR" dirty="0" smtClean="0"/>
+              <a:t>un arrondissement typique</a:t>
+            </a:r>
+            <a:endParaRPr lang="fr-FR" dirty="0"/>
+          </a:p>
+        </p:txBody>
+      </p:sp>
+      <p:pic>
+        <p:nvPicPr>
+          <p:cNvPr id="4" name="Picture 3"/>
+          <p:cNvPicPr>
+            <a:picLocks noChangeAspect="1"/>
+          </p:cNvPicPr>
+          <p:nvPr/>
+        </p:nvPicPr>
+        <p:blipFill>
+          <a:blip r:embed="rId2"/>
+          <a:stretch>
+            <a:fillRect/>
+          </a:stretch>
+        </p:blipFill>
+        <p:spPr>
+          <a:xfrm>
+            <a:off x="1187719" y="2918154"/>
+            <a:ext cx="3791337" cy="2792422"/>
+          </a:xfrm>
+          <a:prstGeom prst="rect">
+            <a:avLst/>
+          </a:prstGeom>
+        </p:spPr>
+      </p:pic>
+      <p:pic>
+        <p:nvPicPr>
+          <p:cNvPr id="5" name="Picture 4"/>
+          <p:cNvPicPr>
+            <a:picLocks noChangeAspect="1"/>
+          </p:cNvPicPr>
+          <p:nvPr/>
+        </p:nvPicPr>
+        <p:blipFill>
+          <a:blip r:embed="rId3"/>
+          <a:stretch>
+            <a:fillRect/>
+          </a:stretch>
+        </p:blipFill>
+        <p:spPr>
+          <a:xfrm>
+            <a:off x="5877754" y="1738643"/>
+            <a:ext cx="5612376" cy="4927628"/>
+          </a:xfrm>
+          <a:prstGeom prst="rect">
+            <a:avLst/>
+          </a:prstGeom>
+        </p:spPr>
+      </p:pic>
+    </p:spTree>
+    <p:extLst>
+      <p:ext uri="{BB962C8B-B14F-4D97-AF65-F5344CB8AC3E}">
+        <p14:creationId xmlns:p14="http://schemas.microsoft.com/office/powerpoint/2010/main" val="1683033158"/>
+      </p:ext>
+    </p:extLst>
+  </p:cSld>
+  <p:clrMapOvr>
+    <a:masterClrMapping/>
+  </p:clrMapOvr>
+</p:sld>
+</file>
+
+<file path=ppt/slides/slide16.xml><?xml version="1.0" encoding="utf-8"?>
+<p:sld xmlns:a="http://schemas.openxmlformats.org/drawingml/2006/main" xmlns:r="http://schemas.openxmlformats.org/officeDocument/2006/relationships" xmlns:p="http://schemas.openxmlformats.org/presentationml/2006/main">
+  <p:cSld>
+    <p:spTree>
+      <p:nvGrpSpPr>
+        <p:cNvPr id="1" name=""/>
+        <p:cNvGrpSpPr/>
+        <p:nvPr/>
+      </p:nvGrpSpPr>
+      <p:grpSpPr>
+        <a:xfrm>
+          <a:off x="0" y="0"/>
+          <a:ext cx="0" cy="0"/>
+          <a:chOff x="0" y="0"/>
+          <a:chExt cx="0" cy="0"/>
+        </a:xfrm>
+      </p:grpSpPr>
+      <p:sp>
+        <p:nvSpPr>
+          <p:cNvPr id="2" name="Title 1"/>
+          <p:cNvSpPr>
+            <a:spLocks noGrp="1"/>
+          </p:cNvSpPr>
+          <p:nvPr>
+            <p:ph type="title"/>
+          </p:nvPr>
+        </p:nvSpPr>
+        <p:spPr>
+          <a:xfrm>
+            <a:off x="918980" y="677744"/>
+            <a:ext cx="9398992" cy="706964"/>
+          </a:xfrm>
+        </p:spPr>
+        <p:txBody>
+          <a:bodyPr/>
+          <a:lstStyle/>
+          <a:p>
+            <a:r>
+              <a:rPr lang="fr-FR" dirty="0" smtClean="0"/>
+              <a:t>4) Cas particuliers: les bois</a:t>
+            </a:r>
+            <a:endParaRPr lang="fr-FR" dirty="0"/>
+          </a:p>
+        </p:txBody>
+      </p:sp>
+      <p:sp>
+        <p:nvSpPr>
+          <p:cNvPr id="3" name="TextBox 2"/>
+          <p:cNvSpPr txBox="1"/>
+          <p:nvPr/>
+        </p:nvSpPr>
+        <p:spPr>
+          <a:xfrm>
+            <a:off x="1090360" y="2346329"/>
+            <a:ext cx="2896660" cy="369332"/>
+          </a:xfrm>
+          <a:prstGeom prst="rect">
+            <a:avLst/>
+          </a:prstGeom>
+          <a:noFill/>
+        </p:spPr>
+        <p:txBody>
+          <a:bodyPr wrap="square" rtlCol="0">
+            <a:spAutoFit/>
+          </a:bodyPr>
+          <a:lstStyle/>
+          <a:p>
+            <a:r>
+              <a:rPr lang="fr-FR" dirty="0" smtClean="0"/>
+              <a:t>Le </a:t>
+            </a:r>
+            <a:r>
+              <a:rPr lang="fr-FR" dirty="0" smtClean="0"/>
+              <a:t>Bois de Vincennes</a:t>
+            </a:r>
+            <a:endParaRPr lang="fr-FR" dirty="0"/>
+          </a:p>
+        </p:txBody>
+      </p:sp>
+      <p:pic>
+        <p:nvPicPr>
+          <p:cNvPr id="4" name="Picture 3"/>
+          <p:cNvPicPr>
+            <a:picLocks noChangeAspect="1"/>
+          </p:cNvPicPr>
+          <p:nvPr/>
+        </p:nvPicPr>
+        <p:blipFill>
+          <a:blip r:embed="rId2"/>
+          <a:stretch>
+            <a:fillRect/>
+          </a:stretch>
+        </p:blipFill>
+        <p:spPr>
+          <a:xfrm>
+            <a:off x="1154954" y="3130529"/>
+            <a:ext cx="3904207" cy="2910409"/>
+          </a:xfrm>
+          <a:prstGeom prst="rect">
+            <a:avLst/>
+          </a:prstGeom>
+        </p:spPr>
+      </p:pic>
+      <p:pic>
+        <p:nvPicPr>
+          <p:cNvPr id="5" name="Picture 4"/>
+          <p:cNvPicPr>
+            <a:picLocks noChangeAspect="1"/>
+          </p:cNvPicPr>
+          <p:nvPr/>
+        </p:nvPicPr>
+        <p:blipFill>
+          <a:blip r:embed="rId3"/>
+          <a:stretch>
+            <a:fillRect/>
+          </a:stretch>
+        </p:blipFill>
+        <p:spPr>
+          <a:xfrm>
+            <a:off x="5389244" y="1384707"/>
+            <a:ext cx="6014209" cy="5199071"/>
+          </a:xfrm>
+          <a:prstGeom prst="rect">
+            <a:avLst/>
+          </a:prstGeom>
+        </p:spPr>
+      </p:pic>
+    </p:spTree>
+    <p:extLst>
+      <p:ext uri="{BB962C8B-B14F-4D97-AF65-F5344CB8AC3E}">
+        <p14:creationId xmlns:p14="http://schemas.microsoft.com/office/powerpoint/2010/main" val="2627803864"/>
+      </p:ext>
+    </p:extLst>
+  </p:cSld>
+  <p:clrMapOvr>
+    <a:masterClrMapping/>
+  </p:clrMapOvr>
+</p:sld>
+</file>
+
+<file path=ppt/slides/slide17.xml><?xml version="1.0" encoding="utf-8"?>
+<p:sld xmlns:a="http://schemas.openxmlformats.org/drawingml/2006/main" xmlns:r="http://schemas.openxmlformats.org/officeDocument/2006/relationships" xmlns:p="http://schemas.openxmlformats.org/presentationml/2006/main">
+  <p:cSld>
+    <p:spTree>
+      <p:nvGrpSpPr>
+        <p:cNvPr id="1" name=""/>
+        <p:cNvGrpSpPr/>
+        <p:nvPr/>
+      </p:nvGrpSpPr>
+      <p:grpSpPr>
+        <a:xfrm>
+          <a:off x="0" y="0"/>
+          <a:ext cx="0" cy="0"/>
+          <a:chOff x="0" y="0"/>
+          <a:chExt cx="0" cy="0"/>
+        </a:xfrm>
+      </p:grpSpPr>
+      <p:sp>
+        <p:nvSpPr>
+          <p:cNvPr id="2" name="Title 1"/>
+          <p:cNvSpPr>
+            <a:spLocks noGrp="1"/>
+          </p:cNvSpPr>
+          <p:nvPr>
+            <p:ph type="title"/>
+          </p:nvPr>
+        </p:nvSpPr>
+        <p:spPr>
+          <a:xfrm>
+            <a:off x="1154954" y="708198"/>
+            <a:ext cx="8761413" cy="706964"/>
+          </a:xfrm>
+        </p:spPr>
+        <p:txBody>
+          <a:bodyPr/>
+          <a:lstStyle/>
+          <a:p>
+            <a:r>
+              <a:rPr lang="fr-FR" dirty="0" smtClean="0"/>
+              <a:t>5) Départements limitrophes</a:t>
+            </a:r>
+            <a:endParaRPr lang="fr-FR" dirty="0"/>
+          </a:p>
+        </p:txBody>
+      </p:sp>
+      <p:sp>
+        <p:nvSpPr>
+          <p:cNvPr id="4" name="TextBox 3"/>
+          <p:cNvSpPr txBox="1"/>
+          <p:nvPr/>
+        </p:nvSpPr>
+        <p:spPr>
+          <a:xfrm>
+            <a:off x="799826" y="2134667"/>
+            <a:ext cx="3104039" cy="1200329"/>
+          </a:xfrm>
+          <a:prstGeom prst="rect">
+            <a:avLst/>
+          </a:prstGeom>
+          <a:noFill/>
+        </p:spPr>
+        <p:txBody>
+          <a:bodyPr wrap="square" rtlCol="0">
+            <a:spAutoFit/>
+          </a:bodyPr>
+          <a:lstStyle/>
+          <a:p>
+            <a:r>
+              <a:rPr lang="fr-FR" dirty="0" smtClean="0"/>
+              <a:t>Les arbres référencés en Seine-Saint-Denis sont uniquement localisé dans des cimetières.</a:t>
+            </a:r>
+            <a:endParaRPr lang="fr-FR" dirty="0"/>
+          </a:p>
+        </p:txBody>
+      </p:sp>
+      <p:pic>
+        <p:nvPicPr>
+          <p:cNvPr id="5" name="Picture 4"/>
+          <p:cNvPicPr>
+            <a:picLocks noChangeAspect="1"/>
+          </p:cNvPicPr>
+          <p:nvPr/>
+        </p:nvPicPr>
+        <p:blipFill>
+          <a:blip r:embed="rId2"/>
+          <a:stretch>
+            <a:fillRect/>
+          </a:stretch>
+        </p:blipFill>
+        <p:spPr>
+          <a:xfrm>
+            <a:off x="1154954" y="3397137"/>
+            <a:ext cx="3761908" cy="2850280"/>
+          </a:xfrm>
+          <a:prstGeom prst="rect">
+            <a:avLst/>
+          </a:prstGeom>
+        </p:spPr>
+      </p:pic>
+      <p:pic>
+        <p:nvPicPr>
+          <p:cNvPr id="6" name="Picture 5"/>
+          <p:cNvPicPr>
+            <a:picLocks noChangeAspect="1"/>
+          </p:cNvPicPr>
+          <p:nvPr/>
+        </p:nvPicPr>
+        <p:blipFill>
+          <a:blip r:embed="rId3"/>
+          <a:stretch>
+            <a:fillRect/>
+          </a:stretch>
+        </p:blipFill>
+        <p:spPr>
+          <a:xfrm>
+            <a:off x="5471374" y="1415162"/>
+            <a:ext cx="5996972" cy="5196350"/>
+          </a:xfrm>
+          <a:prstGeom prst="rect">
+            <a:avLst/>
+          </a:prstGeom>
+        </p:spPr>
+      </p:pic>
+    </p:spTree>
+    <p:extLst>
+      <p:ext uri="{BB962C8B-B14F-4D97-AF65-F5344CB8AC3E}">
+        <p14:creationId xmlns:p14="http://schemas.microsoft.com/office/powerpoint/2010/main" val="2373912460"/>
+      </p:ext>
+    </p:extLst>
+  </p:cSld>
+  <p:clrMapOvr>
+    <a:masterClrMapping/>
+  </p:clrMapOvr>
+</p:sld>
+</file>
+
+<file path=ppt/slides/slide18.xml><?xml version="1.0" encoding="utf-8"?>
+<p:sld xmlns:a="http://schemas.openxmlformats.org/drawingml/2006/main" xmlns:r="http://schemas.openxmlformats.org/officeDocument/2006/relationships" xmlns:p="http://schemas.openxmlformats.org/presentationml/2006/main">
+  <p:cSld>
+    <p:spTree>
+      <p:nvGrpSpPr>
+        <p:cNvPr id="1" name=""/>
+        <p:cNvGrpSpPr/>
+        <p:nvPr/>
+      </p:nvGrpSpPr>
+      <p:grpSpPr>
+        <a:xfrm>
+          <a:off x="0" y="0"/>
+          <a:ext cx="0" cy="0"/>
+          <a:chOff x="0" y="0"/>
+          <a:chExt cx="0" cy="0"/>
+        </a:xfrm>
+      </p:grpSpPr>
+      <p:sp>
+        <p:nvSpPr>
+          <p:cNvPr id="2" name="Title 1"/>
+          <p:cNvSpPr>
+            <a:spLocks noGrp="1"/>
+          </p:cNvSpPr>
+          <p:nvPr>
+            <p:ph type="title"/>
+          </p:nvPr>
+        </p:nvSpPr>
+        <p:spPr/>
+        <p:txBody>
+          <a:bodyPr/>
+          <a:lstStyle/>
+          <a:p>
+            <a:r>
+              <a:rPr lang="fr-FR" dirty="0" smtClean="0"/>
+              <a:t>6) Bilan des recommandations </a:t>
             </a:r>
             <a:endParaRPr lang="fr-FR" dirty="0"/>
           </a:p>

</xml_diff>

<commit_message>
final version with pptx
</commit_message>
<xml_diff>
--- a/P2_01_presentation.pptx
+++ b/P2_01_presentation.pptx
@@ -23,6 +23,9 @@
     <p:sldId id="273" r:id="rId17"/>
     <p:sldId id="268" r:id="rId18"/>
     <p:sldId id="269" r:id="rId19"/>
+    <p:sldId id="274" r:id="rId20"/>
+    <p:sldId id="275" r:id="rId21"/>
+    <p:sldId id="276" r:id="rId22"/>
   </p:sldIdLst>
   <p:sldSz cx="12192000" cy="6858000"/>
   <p:notesSz cx="6858000" cy="9144000"/>
@@ -13572,11 +13575,7 @@
           <a:p>
             <a:r>
               <a:rPr lang="fr-FR" dirty="0" smtClean="0"/>
-              <a:t>2) </a:t>
-            </a:r>
-            <a:r>
-              <a:rPr lang="fr-FR" dirty="0" smtClean="0"/>
-              <a:t>Arrondissements non périphériques </a:t>
+              <a:t>2) Arrondissements non périphériques </a:t>
             </a:r>
             <a:endParaRPr lang="fr-FR" dirty="0"/>
           </a:p>
@@ -13606,11 +13605,7 @@
           <a:p>
             <a:r>
               <a:rPr lang="fr-FR" dirty="0" smtClean="0"/>
-              <a:t>Le </a:t>
-            </a:r>
-            <a:r>
-              <a:rPr lang="fr-FR" dirty="0" smtClean="0"/>
-              <a:t>4</a:t>
+              <a:t>Le 4</a:t>
             </a:r>
             <a:r>
               <a:rPr lang="fr-FR" baseline="30000" dirty="0" smtClean="0"/>
@@ -13618,11 +13613,7 @@
             </a:r>
             <a:r>
               <a:rPr lang="fr-FR" dirty="0" smtClean="0"/>
-              <a:t>, </a:t>
-            </a:r>
-            <a:r>
-              <a:rPr lang="fr-FR" dirty="0" smtClean="0"/>
-              <a:t>un arrondissement typique</a:t>
+              <a:t>, un arrondissement typique</a:t>
             </a:r>
             <a:endParaRPr lang="fr-FR" dirty="0"/>
           </a:p>
@@ -13761,11 +13752,7 @@
           <a:p>
             <a:r>
               <a:rPr lang="fr-FR" dirty="0" smtClean="0"/>
-              <a:t>Le </a:t>
-            </a:r>
-            <a:r>
-              <a:rPr lang="fr-FR" dirty="0" smtClean="0"/>
-              <a:t>2</a:t>
+              <a:t>Le 2</a:t>
             </a:r>
             <a:r>
               <a:rPr lang="fr-FR" baseline="30000" dirty="0" smtClean="0"/>
@@ -13997,11 +13984,7 @@
           <a:p>
             <a:r>
               <a:rPr lang="fr-FR" dirty="0" smtClean="0"/>
-              <a:t>Le </a:t>
-            </a:r>
-            <a:r>
-              <a:rPr lang="fr-FR" dirty="0" smtClean="0"/>
-              <a:t>15</a:t>
+              <a:t>Le 15</a:t>
             </a:r>
             <a:r>
               <a:rPr lang="fr-FR" baseline="30000" dirty="0" smtClean="0"/>
@@ -14009,11 +13992,7 @@
             </a:r>
             <a:r>
               <a:rPr lang="fr-FR" dirty="0" smtClean="0"/>
-              <a:t>, </a:t>
-            </a:r>
-            <a:r>
-              <a:rPr lang="fr-FR" dirty="0" smtClean="0"/>
-              <a:t>un arrondissement typique</a:t>
+              <a:t>, un arrondissement typique</a:t>
             </a:r>
             <a:endParaRPr lang="fr-FR" dirty="0"/>
           </a:p>
@@ -14149,11 +14128,7 @@
           <a:p>
             <a:r>
               <a:rPr lang="fr-FR" dirty="0" smtClean="0"/>
-              <a:t>Le </a:t>
-            </a:r>
-            <a:r>
-              <a:rPr lang="fr-FR" dirty="0" smtClean="0"/>
-              <a:t>Bois de Vincennes</a:t>
+              <a:t>Le Bois de Vincennes</a:t>
             </a:r>
             <a:endParaRPr lang="fr-FR" dirty="0"/>
           </a:p>
@@ -14396,10 +14371,231 @@
           </a:p>
         </p:txBody>
       </p:sp>
+      <p:sp>
+        <p:nvSpPr>
+          <p:cNvPr id="3" name="TextBox 2"/>
+          <p:cNvSpPr txBox="1"/>
+          <p:nvPr/>
+        </p:nvSpPr>
+        <p:spPr>
+          <a:xfrm>
+            <a:off x="914400" y="2271252"/>
+            <a:ext cx="9834225" cy="3785652"/>
+          </a:xfrm>
+          <a:prstGeom prst="rect">
+            <a:avLst/>
+          </a:prstGeom>
+          <a:noFill/>
+        </p:spPr>
+        <p:txBody>
+          <a:bodyPr wrap="square" rtlCol="0">
+            <a:spAutoFit/>
+          </a:bodyPr>
+          <a:lstStyle/>
+          <a:p>
+            <a:pPr algn="ctr"/>
+            <a:r>
+              <a:rPr lang="fr-FR" sz="2000" dirty="0" smtClean="0"/>
+              <a:t>Les </a:t>
+            </a:r>
+            <a:r>
+              <a:rPr lang="fr-FR" sz="2000" dirty="0"/>
+              <a:t>domanialités représentent un enjeux </a:t>
+            </a:r>
+            <a:r>
+              <a:rPr lang="fr-FR" sz="2000" dirty="0" smtClean="0"/>
+              <a:t>majeur pour l’organisation des tournées: </a:t>
+            </a:r>
+          </a:p>
+          <a:p>
+            <a:pPr algn="ctr"/>
+            <a:endParaRPr lang="fr-FR" sz="2000" dirty="0"/>
+          </a:p>
+          <a:p>
+            <a:pPr algn="ctr"/>
+            <a:r>
+              <a:rPr lang="fr-FR" sz="2000" dirty="0" smtClean="0"/>
+              <a:t>Celles </a:t>
+            </a:r>
+            <a:r>
+              <a:rPr lang="fr-FR" sz="2000" dirty="0"/>
+              <a:t>qui disposent de leurs propres contraintes en terme d'accessibilité doivent être traitées de manière prioritaire</a:t>
+            </a:r>
+            <a:r>
+              <a:rPr lang="fr-FR" sz="2000" dirty="0" smtClean="0"/>
+              <a:t>:</a:t>
+            </a:r>
+          </a:p>
+          <a:p>
+            <a:pPr algn="ctr"/>
+            <a:endParaRPr lang="fr-FR" sz="2000" dirty="0"/>
+          </a:p>
+          <a:p>
+            <a:pPr algn="ctr"/>
+            <a:r>
+              <a:rPr lang="fr-FR" sz="2000" dirty="0" smtClean="0"/>
+              <a:t>a) </a:t>
+            </a:r>
+            <a:r>
+              <a:rPr lang="fr-FR" sz="2000" dirty="0"/>
+              <a:t>Quand un véhicule élévateur est nécessaire à l'entretient, les </a:t>
+            </a:r>
+            <a:r>
+              <a:rPr lang="fr-FR" sz="2000" dirty="0" smtClean="0"/>
+              <a:t>arbres </a:t>
+            </a:r>
+            <a:r>
+              <a:rPr lang="fr-FR" sz="2000" dirty="0"/>
+              <a:t>de la </a:t>
+            </a:r>
+            <a:r>
+              <a:rPr lang="fr-FR" sz="2000" dirty="0" smtClean="0"/>
+              <a:t>voirie </a:t>
+            </a:r>
+            <a:r>
+              <a:rPr lang="fr-FR" sz="2000" dirty="0"/>
+              <a:t>doivent être entretenus en dehors des horaires </a:t>
+            </a:r>
+            <a:r>
+              <a:rPr lang="fr-FR" sz="2000" dirty="0" smtClean="0"/>
+              <a:t>de </a:t>
+            </a:r>
+            <a:r>
+              <a:rPr lang="fr-FR" sz="2000" dirty="0"/>
+              <a:t>grand </a:t>
+            </a:r>
+            <a:r>
+              <a:rPr lang="fr-FR" sz="2000" dirty="0" smtClean="0"/>
+              <a:t>trafic (après 9h30 et avant 16h30).</a:t>
+            </a:r>
+          </a:p>
+          <a:p>
+            <a:pPr algn="ctr"/>
+            <a:endParaRPr lang="fr-FR" sz="2000" dirty="0"/>
+          </a:p>
+          <a:p>
+            <a:pPr algn="ctr"/>
+            <a:r>
+              <a:rPr lang="fr-FR" sz="2000" dirty="0" smtClean="0"/>
+              <a:t>b) Les </a:t>
+            </a:r>
+            <a:r>
+              <a:rPr lang="fr-FR" sz="2000" dirty="0"/>
+              <a:t>arbres des écoles peuvent être entretenus en dehors des </a:t>
+            </a:r>
+            <a:r>
+              <a:rPr lang="fr-FR" sz="2000" dirty="0" smtClean="0"/>
+              <a:t>périodes </a:t>
+            </a:r>
+            <a:r>
+              <a:rPr lang="fr-FR" sz="2000" dirty="0"/>
+              <a:t>de </a:t>
+            </a:r>
+            <a:r>
+              <a:rPr lang="fr-FR" sz="2000" dirty="0" smtClean="0"/>
+              <a:t>cours </a:t>
+            </a:r>
+            <a:r>
+              <a:rPr lang="fr-FR" sz="2000" dirty="0"/>
+              <a:t>(mercredis et vacances scolaires).</a:t>
+            </a:r>
+          </a:p>
+        </p:txBody>
+      </p:sp>
     </p:spTree>
     <p:extLst>
       <p:ext uri="{BB962C8B-B14F-4D97-AF65-F5344CB8AC3E}">
         <p14:creationId xmlns:p14="http://schemas.microsoft.com/office/powerpoint/2010/main" val="51399808"/>
+      </p:ext>
+    </p:extLst>
+  </p:cSld>
+  <p:clrMapOvr>
+    <a:masterClrMapping/>
+  </p:clrMapOvr>
+</p:sld>
+</file>
+
+<file path=ppt/slides/slide19.xml><?xml version="1.0" encoding="utf-8"?>
+<p:sld xmlns:a="http://schemas.openxmlformats.org/drawingml/2006/main" xmlns:r="http://schemas.openxmlformats.org/officeDocument/2006/relationships" xmlns:p="http://schemas.openxmlformats.org/presentationml/2006/main">
+  <p:cSld>
+    <p:spTree>
+      <p:nvGrpSpPr>
+        <p:cNvPr id="1" name=""/>
+        <p:cNvGrpSpPr/>
+        <p:nvPr/>
+      </p:nvGrpSpPr>
+      <p:grpSpPr>
+        <a:xfrm>
+          <a:off x="0" y="0"/>
+          <a:ext cx="0" cy="0"/>
+          <a:chOff x="0" y="0"/>
+          <a:chExt cx="0" cy="0"/>
+        </a:xfrm>
+      </p:grpSpPr>
+      <p:sp>
+        <p:nvSpPr>
+          <p:cNvPr id="2" name="TextBox 1"/>
+          <p:cNvSpPr txBox="1"/>
+          <p:nvPr/>
+        </p:nvSpPr>
+        <p:spPr>
+          <a:xfrm>
+            <a:off x="1309657" y="1663617"/>
+            <a:ext cx="9480263" cy="3600986"/>
+          </a:xfrm>
+          <a:prstGeom prst="rect">
+            <a:avLst/>
+          </a:prstGeom>
+          <a:noFill/>
+        </p:spPr>
+        <p:txBody>
+          <a:bodyPr wrap="square" rtlCol="0">
+            <a:spAutoFit/>
+          </a:bodyPr>
+          <a:lstStyle/>
+          <a:p>
+            <a:r>
+              <a:rPr lang="fr-FR" sz="2400" dirty="0" smtClean="0"/>
+              <a:t>Peu </a:t>
+            </a:r>
+            <a:r>
+              <a:rPr lang="fr-FR" sz="2400" dirty="0"/>
+              <a:t>nombreux et particulièrement contraignants à entretenir, les arbres de plus de 20m pourront faire l'objet de tournées d'entretient séparées.</a:t>
+            </a:r>
+          </a:p>
+          <a:p>
+            <a:endParaRPr lang="fr-FR" sz="2400" dirty="0" smtClean="0"/>
+          </a:p>
+          <a:p>
+            <a:r>
+              <a:rPr lang="fr-FR" sz="2400" dirty="0" smtClean="0"/>
+              <a:t>Les </a:t>
+            </a:r>
+            <a:r>
+              <a:rPr lang="fr-FR" sz="2400" dirty="0"/>
+              <a:t>arrondissements au centre de Paris (1er à 11e) sont les moins contraignants: il comportent peu d'arbres et les arbres sont présents uniquement dans les rues, les écoles, les crèches et les jardins publiques (faciles d'accès, horaires fixes</a:t>
+            </a:r>
+            <a:r>
+              <a:rPr lang="fr-FR" sz="2400" dirty="0" smtClean="0"/>
+              <a:t>).</a:t>
+            </a:r>
+          </a:p>
+          <a:p>
+            <a:pPr marL="285750" indent="-285750">
+              <a:buFontTx/>
+              <a:buChar char="-"/>
+            </a:pPr>
+            <a:endParaRPr lang="fr-FR" dirty="0"/>
+          </a:p>
+          <a:p>
+            <a:endParaRPr lang="fr-FR" dirty="0"/>
+          </a:p>
+        </p:txBody>
+      </p:sp>
+    </p:spTree>
+    <p:extLst>
+      <p:ext uri="{BB962C8B-B14F-4D97-AF65-F5344CB8AC3E}">
+        <p14:creationId xmlns:p14="http://schemas.microsoft.com/office/powerpoint/2010/main" val="1743169162"/>
       </p:ext>
     </p:extLst>
   </p:cSld>
@@ -14530,6 +14726,230 @@
       </p:par>
     </p:tnLst>
   </p:timing>
+</p:sld>
+</file>
+
+<file path=ppt/slides/slide20.xml><?xml version="1.0" encoding="utf-8"?>
+<p:sld xmlns:a="http://schemas.openxmlformats.org/drawingml/2006/main" xmlns:r="http://schemas.openxmlformats.org/officeDocument/2006/relationships" xmlns:p="http://schemas.openxmlformats.org/presentationml/2006/main">
+  <p:cSld>
+    <p:spTree>
+      <p:nvGrpSpPr>
+        <p:cNvPr id="1" name=""/>
+        <p:cNvGrpSpPr/>
+        <p:nvPr/>
+      </p:nvGrpSpPr>
+      <p:grpSpPr>
+        <a:xfrm>
+          <a:off x="0" y="0"/>
+          <a:ext cx="0" cy="0"/>
+          <a:chOff x="0" y="0"/>
+          <a:chExt cx="0" cy="0"/>
+        </a:xfrm>
+      </p:grpSpPr>
+      <p:sp>
+        <p:nvSpPr>
+          <p:cNvPr id="2" name="TextBox 1"/>
+          <p:cNvSpPr txBox="1"/>
+          <p:nvPr/>
+        </p:nvSpPr>
+        <p:spPr>
+          <a:xfrm>
+            <a:off x="1114977" y="1327355"/>
+            <a:ext cx="9344578" cy="3785652"/>
+          </a:xfrm>
+          <a:prstGeom prst="rect">
+            <a:avLst/>
+          </a:prstGeom>
+          <a:noFill/>
+        </p:spPr>
+        <p:txBody>
+          <a:bodyPr wrap="square" rtlCol="0">
+            <a:spAutoFit/>
+          </a:bodyPr>
+          <a:lstStyle/>
+          <a:p>
+            <a:pPr algn="ctr"/>
+            <a:r>
+              <a:rPr lang="fr-FR" sz="2400" dirty="0" smtClean="0"/>
+              <a:t>Les </a:t>
+            </a:r>
+            <a:r>
+              <a:rPr lang="fr-FR" sz="2400" dirty="0"/>
+              <a:t>arrondissements périphériques présentent plusieurs challenges</a:t>
+            </a:r>
+            <a:r>
+              <a:rPr lang="fr-FR" sz="2400" dirty="0" smtClean="0"/>
+              <a:t>:</a:t>
+            </a:r>
+          </a:p>
+          <a:p>
+            <a:pPr algn="ctr"/>
+            <a:endParaRPr lang="fr-FR" sz="2400" dirty="0"/>
+          </a:p>
+          <a:p>
+            <a:pPr algn="ctr"/>
+            <a:r>
+              <a:rPr lang="fr-FR" sz="2400" dirty="0"/>
+              <a:t>  - Multiples domanialités, ce qui complexifie les contraintes d'autorisation et d'horaires d'accès</a:t>
+            </a:r>
+            <a:r>
+              <a:rPr lang="fr-FR" sz="2400" dirty="0" smtClean="0"/>
+              <a:t>.</a:t>
+            </a:r>
+          </a:p>
+          <a:p>
+            <a:pPr algn="ctr"/>
+            <a:endParaRPr lang="fr-FR" sz="2400" dirty="0"/>
+          </a:p>
+          <a:p>
+            <a:pPr algn="ctr"/>
+            <a:r>
+              <a:rPr lang="fr-FR" sz="2400" dirty="0"/>
+              <a:t>  - Les arbres bordant le périphérique doivent être </a:t>
+            </a:r>
+            <a:r>
+              <a:rPr lang="fr-FR" sz="2400" dirty="0" smtClean="0"/>
+              <a:t>entretenus </a:t>
+            </a:r>
+            <a:r>
+              <a:rPr lang="fr-FR" sz="2400" dirty="0"/>
+              <a:t>avec précaution (pour éviter les éventuels accidents), et tenir compte du fait que le travail y est plus pénible (bruit et pollution).</a:t>
+            </a:r>
+          </a:p>
+        </p:txBody>
+      </p:sp>
+    </p:spTree>
+    <p:extLst>
+      <p:ext uri="{BB962C8B-B14F-4D97-AF65-F5344CB8AC3E}">
+        <p14:creationId xmlns:p14="http://schemas.microsoft.com/office/powerpoint/2010/main" val="1987584078"/>
+      </p:ext>
+    </p:extLst>
+  </p:cSld>
+  <p:clrMapOvr>
+    <a:masterClrMapping/>
+  </p:clrMapOvr>
+</p:sld>
+</file>
+
+<file path=ppt/slides/slide21.xml><?xml version="1.0" encoding="utf-8"?>
+<p:sld xmlns:a="http://schemas.openxmlformats.org/drawingml/2006/main" xmlns:r="http://schemas.openxmlformats.org/officeDocument/2006/relationships" xmlns:p="http://schemas.openxmlformats.org/presentationml/2006/main">
+  <p:cSld>
+    <p:spTree>
+      <p:nvGrpSpPr>
+        <p:cNvPr id="1" name=""/>
+        <p:cNvGrpSpPr/>
+        <p:nvPr/>
+      </p:nvGrpSpPr>
+      <p:grpSpPr>
+        <a:xfrm>
+          <a:off x="0" y="0"/>
+          <a:ext cx="0" cy="0"/>
+          <a:chOff x="0" y="0"/>
+          <a:chExt cx="0" cy="0"/>
+        </a:xfrm>
+      </p:grpSpPr>
+      <p:sp>
+        <p:nvSpPr>
+          <p:cNvPr id="3" name="TextBox 2"/>
+          <p:cNvSpPr txBox="1"/>
+          <p:nvPr/>
+        </p:nvSpPr>
+        <p:spPr>
+          <a:xfrm>
+            <a:off x="843608" y="831809"/>
+            <a:ext cx="9893218" cy="4893647"/>
+          </a:xfrm>
+          <a:prstGeom prst="rect">
+            <a:avLst/>
+          </a:prstGeom>
+          <a:noFill/>
+        </p:spPr>
+        <p:txBody>
+          <a:bodyPr wrap="square" rtlCol="0">
+            <a:spAutoFit/>
+          </a:bodyPr>
+          <a:lstStyle/>
+          <a:p>
+            <a:pPr algn="ctr"/>
+            <a:r>
+              <a:rPr lang="fr-FR" sz="2400" dirty="0"/>
+              <a:t>- Certains lieux méritent une attention exceptionnelle: les lieux comme le Champs de </a:t>
+            </a:r>
+            <a:r>
+              <a:rPr lang="fr-FR" sz="2400" dirty="0" smtClean="0"/>
+              <a:t>Mars ou les Champs Elysées </a:t>
+            </a:r>
+            <a:r>
+              <a:rPr lang="fr-FR" sz="2400" dirty="0"/>
+              <a:t>doivent profiter d'un entretient beaucoup plus poussé, notamment en terme d'esthétique.</a:t>
+            </a:r>
+          </a:p>
+          <a:p>
+            <a:pPr algn="ctr"/>
+            <a:endParaRPr lang="fr-FR" sz="2400" dirty="0"/>
+          </a:p>
+          <a:p>
+            <a:pPr algn="ctr"/>
+            <a:r>
+              <a:rPr lang="fr-FR" sz="2400" dirty="0"/>
+              <a:t>- Les bois peuvent présenter des contraintes d'accès supplémentaires pour l'entretient des arbres: l'absence de route dans les zones denses prohibe l'usage de véhicules élévateurs.</a:t>
+            </a:r>
+          </a:p>
+          <a:p>
+            <a:pPr algn="ctr"/>
+            <a:endParaRPr lang="fr-FR" sz="2400" dirty="0"/>
+          </a:p>
+          <a:p>
+            <a:pPr algn="ctr"/>
+            <a:r>
+              <a:rPr lang="fr-FR" sz="2400" dirty="0"/>
+              <a:t>- </a:t>
+            </a:r>
+            <a:r>
+              <a:rPr lang="fr-FR" sz="2400" dirty="0" smtClean="0"/>
+              <a:t>Pour les </a:t>
+            </a:r>
+            <a:r>
+              <a:rPr lang="fr-FR" sz="2400" dirty="0"/>
+              <a:t>arbres des cimetières des départements </a:t>
+            </a:r>
+            <a:r>
+              <a:rPr lang="fr-FR" sz="2400" dirty="0" smtClean="0"/>
+              <a:t>limitrophes, </a:t>
+            </a:r>
+            <a:r>
+              <a:rPr lang="fr-FR" sz="2400" dirty="0"/>
+              <a:t>Il parait judicieux </a:t>
+            </a:r>
+            <a:r>
+              <a:rPr lang="fr-FR" sz="2400" dirty="0" smtClean="0"/>
+              <a:t>que l’entretient soit effectué par </a:t>
+            </a:r>
+            <a:r>
+              <a:rPr lang="fr-FR" sz="2400" dirty="0"/>
+              <a:t>les équipes les plus proches, pour limiter les frais liés au temps de transport. Cela peut impliquer de déléguer des </a:t>
+            </a:r>
+            <a:r>
+              <a:rPr lang="fr-FR" sz="2400" dirty="0" smtClean="0"/>
+              <a:t>budgets, </a:t>
+            </a:r>
+            <a:r>
+              <a:rPr lang="fr-FR" sz="2400" dirty="0"/>
+              <a:t>mais réduira les coûts.</a:t>
+            </a:r>
+          </a:p>
+        </p:txBody>
+      </p:sp>
+    </p:spTree>
+    <p:extLst>
+      <p:ext uri="{BB962C8B-B14F-4D97-AF65-F5344CB8AC3E}">
+        <p14:creationId xmlns:p14="http://schemas.microsoft.com/office/powerpoint/2010/main" val="2026311180"/>
+      </p:ext>
+    </p:extLst>
+  </p:cSld>
+  <p:clrMapOvr>
+    <a:masterClrMapping/>
+  </p:clrMapOvr>
 </p:sld>
 </file>
 

</xml_diff>